<commit_message>
update the sandboxed shema
apss are in-between the VEE diagram, to highlight OTA
thanks to acolleux
</commit_message>
<xml_diff>
--- a/ApplicationDeveloperGuide/images/standalone-sandboxed.pptx
+++ b/ApplicationDeveloperGuide/images/standalone-sandboxed.pptx
@@ -13688,8 +13688,8 @@
         </p:nvSpPr>
         <p:spPr>
           <a:xfrm>
-            <a:off x="3968151" y="1515013"/>
-            <a:ext cx="4270516" cy="2159952"/>
+            <a:off x="3968151" y="1839757"/>
+            <a:ext cx="4270516" cy="1835208"/>
           </a:xfrm>
           <a:prstGeom prst="roundRect">
             <a:avLst>
@@ -13766,8 +13766,8 @@
         </p:nvSpPr>
         <p:spPr>
           <a:xfrm rot="10800000">
-            <a:off x="4037154" y="1515013"/>
-            <a:ext cx="4139465" cy="688355"/>
+            <a:off x="4037153" y="1839758"/>
+            <a:ext cx="4139465" cy="363609"/>
           </a:xfrm>
           <a:prstGeom prst="round2SameRect">
             <a:avLst>

</xml_diff>